<commit_message>
adding more to pptx
</commit_message>
<xml_diff>
--- a/docs/Step-Functions-File-Processing-Workflow.pptx
+++ b/docs/Step-Functions-File-Processing-Workflow.pptx
@@ -104,6 +104,11 @@
       </a:defRPr>
     </a:lvl9pPr>
   </p:defaultTextStyle>
+  <p:extLst>
+    <p:ext uri="{EFAFB233-063F-42B5-8137-9DF3F51BA10A}">
+      <p15:sldGuideLst xmlns:p15="http://schemas.microsoft.com/office/powerpoint/2012/main"/>
+    </p:ext>
+  </p:extLst>
 </p:presentation>
 </file>
 
@@ -254,7 +259,7 @@
           <a:p>
             <a:fld id="{A2C82C91-704E-FD44-8534-5599E7D3CBAA}" type="datetimeFigureOut">
               <a:rPr lang="en-US" smtClean="0"/>
-              <a:t>8/2/24</a:t>
+              <a:t>8/22/24</a:t>
             </a:fld>
             <a:endParaRPr lang="en-US"/>
           </a:p>
@@ -452,7 +457,7 @@
           <a:p>
             <a:fld id="{A2C82C91-704E-FD44-8534-5599E7D3CBAA}" type="datetimeFigureOut">
               <a:rPr lang="en-US" smtClean="0"/>
-              <a:t>8/2/24</a:t>
+              <a:t>8/22/24</a:t>
             </a:fld>
             <a:endParaRPr lang="en-US"/>
           </a:p>
@@ -660,7 +665,7 @@
           <a:p>
             <a:fld id="{A2C82C91-704E-FD44-8534-5599E7D3CBAA}" type="datetimeFigureOut">
               <a:rPr lang="en-US" smtClean="0"/>
-              <a:t>8/2/24</a:t>
+              <a:t>8/22/24</a:t>
             </a:fld>
             <a:endParaRPr lang="en-US"/>
           </a:p>
@@ -858,7 +863,7 @@
           <a:p>
             <a:fld id="{A2C82C91-704E-FD44-8534-5599E7D3CBAA}" type="datetimeFigureOut">
               <a:rPr lang="en-US" smtClean="0"/>
-              <a:t>8/2/24</a:t>
+              <a:t>8/22/24</a:t>
             </a:fld>
             <a:endParaRPr lang="en-US"/>
           </a:p>
@@ -1133,7 +1138,7 @@
           <a:p>
             <a:fld id="{A2C82C91-704E-FD44-8534-5599E7D3CBAA}" type="datetimeFigureOut">
               <a:rPr lang="en-US" smtClean="0"/>
-              <a:t>8/2/24</a:t>
+              <a:t>8/22/24</a:t>
             </a:fld>
             <a:endParaRPr lang="en-US"/>
           </a:p>
@@ -1398,7 +1403,7 @@
           <a:p>
             <a:fld id="{A2C82C91-704E-FD44-8534-5599E7D3CBAA}" type="datetimeFigureOut">
               <a:rPr lang="en-US" smtClean="0"/>
-              <a:t>8/2/24</a:t>
+              <a:t>8/22/24</a:t>
             </a:fld>
             <a:endParaRPr lang="en-US"/>
           </a:p>
@@ -1810,7 +1815,7 @@
           <a:p>
             <a:fld id="{A2C82C91-704E-FD44-8534-5599E7D3CBAA}" type="datetimeFigureOut">
               <a:rPr lang="en-US" smtClean="0"/>
-              <a:t>8/2/24</a:t>
+              <a:t>8/22/24</a:t>
             </a:fld>
             <a:endParaRPr lang="en-US"/>
           </a:p>
@@ -1951,7 +1956,7 @@
           <a:p>
             <a:fld id="{A2C82C91-704E-FD44-8534-5599E7D3CBAA}" type="datetimeFigureOut">
               <a:rPr lang="en-US" smtClean="0"/>
-              <a:t>8/2/24</a:t>
+              <a:t>8/22/24</a:t>
             </a:fld>
             <a:endParaRPr lang="en-US"/>
           </a:p>
@@ -2064,7 +2069,7 @@
           <a:p>
             <a:fld id="{A2C82C91-704E-FD44-8534-5599E7D3CBAA}" type="datetimeFigureOut">
               <a:rPr lang="en-US" smtClean="0"/>
-              <a:t>8/2/24</a:t>
+              <a:t>8/22/24</a:t>
             </a:fld>
             <a:endParaRPr lang="en-US"/>
           </a:p>
@@ -2375,7 +2380,7 @@
           <a:p>
             <a:fld id="{A2C82C91-704E-FD44-8534-5599E7D3CBAA}" type="datetimeFigureOut">
               <a:rPr lang="en-US" smtClean="0"/>
-              <a:t>8/2/24</a:t>
+              <a:t>8/22/24</a:t>
             </a:fld>
             <a:endParaRPr lang="en-US"/>
           </a:p>
@@ -2663,7 +2668,7 @@
           <a:p>
             <a:fld id="{A2C82C91-704E-FD44-8534-5599E7D3CBAA}" type="datetimeFigureOut">
               <a:rPr lang="en-US" smtClean="0"/>
-              <a:t>8/2/24</a:t>
+              <a:t>8/22/24</a:t>
             </a:fld>
             <a:endParaRPr lang="en-US"/>
           </a:p>
@@ -2904,7 +2909,7 @@
           <a:p>
             <a:fld id="{A2C82C91-704E-FD44-8534-5599E7D3CBAA}" type="datetimeFigureOut">
               <a:rPr lang="en-US" smtClean="0"/>
-              <a:t>8/2/24</a:t>
+              <a:t>8/22/24</a:t>
             </a:fld>
             <a:endParaRPr lang="en-US"/>
           </a:p>
@@ -3354,52 +3359,23 @@
           </a:p>
         </p:txBody>
       </p:sp>
-      <p:pic>
-        <p:nvPicPr>
-          <p:cNvPr id="9" name="Content Placeholder 8" descr="A screenshot of a computer&#10;&#10;Description automatically generated">
-            <a:extLst>
-              <a:ext uri="{FF2B5EF4-FFF2-40B4-BE49-F238E27FC236}">
-                <a16:creationId xmlns:a16="http://schemas.microsoft.com/office/drawing/2014/main" id="{4A165629-B043-CEB3-BD0D-5231122E0880}"/>
-              </a:ext>
-            </a:extLst>
-          </p:cNvPr>
-          <p:cNvPicPr>
-            <a:picLocks noGrp="1" noChangeAspect="1"/>
-          </p:cNvPicPr>
-          <p:nvPr>
-            <p:ph idx="1"/>
-          </p:nvPr>
-        </p:nvPicPr>
-        <p:blipFill>
-          <a:blip r:embed="rId2"/>
-          <a:stretch>
-            <a:fillRect/>
-          </a:stretch>
-        </p:blipFill>
+      <p:sp>
+        <p:nvSpPr>
+          <p:cNvPr id="11" name="Content Placeholder 2">
+            <a:extLst>
+              <a:ext uri="{FF2B5EF4-FFF2-40B4-BE49-F238E27FC236}">
+                <a16:creationId xmlns:a16="http://schemas.microsoft.com/office/drawing/2014/main" id="{D7DDB3E8-6B0F-A490-B402-4751B306B82C}"/>
+              </a:ext>
+            </a:extLst>
+          </p:cNvPr>
+          <p:cNvSpPr txBox="1">
+            <a:spLocks/>
+          </p:cNvSpPr>
+          <p:nvPr/>
+        </p:nvSpPr>
         <p:spPr>
           <a:xfrm>
-            <a:off x="93034" y="804695"/>
-            <a:ext cx="12098966" cy="3841733"/>
-          </a:xfrm>
-        </p:spPr>
-      </p:pic>
-      <p:sp>
-        <p:nvSpPr>
-          <p:cNvPr id="11" name="Content Placeholder 2">
-            <a:extLst>
-              <a:ext uri="{FF2B5EF4-FFF2-40B4-BE49-F238E27FC236}">
-                <a16:creationId xmlns:a16="http://schemas.microsoft.com/office/drawing/2014/main" id="{D7DDB3E8-6B0F-A490-B402-4751B306B82C}"/>
-              </a:ext>
-            </a:extLst>
-          </p:cNvPr>
-          <p:cNvSpPr txBox="1">
-            <a:spLocks/>
-          </p:cNvSpPr>
-          <p:nvPr/>
-        </p:nvSpPr>
-        <p:spPr>
-          <a:xfrm>
-            <a:off x="6096000" y="4646428"/>
+            <a:off x="4493141" y="4646428"/>
             <a:ext cx="6096000" cy="2211572"/>
           </a:xfrm>
           <a:prstGeom prst="rect">
@@ -3660,6 +3636,257 @@
           </a:p>
         </p:txBody>
       </p:sp>
+      <p:pic>
+        <p:nvPicPr>
+          <p:cNvPr id="4" name="Graphic 3" descr="Badge 6 with solid fill">
+            <a:extLst>
+              <a:ext uri="{FF2B5EF4-FFF2-40B4-BE49-F238E27FC236}">
+                <a16:creationId xmlns:a16="http://schemas.microsoft.com/office/drawing/2014/main" id="{A29A9408-50AD-57C6-21A9-AE4EC8C6C9E9}"/>
+              </a:ext>
+            </a:extLst>
+          </p:cNvPr>
+          <p:cNvPicPr>
+            <a:picLocks noChangeAspect="1"/>
+          </p:cNvPicPr>
+          <p:nvPr/>
+        </p:nvPicPr>
+        <p:blipFill>
+          <a:blip r:embed="rId2">
+            <a:extLst>
+              <a:ext uri="{96DAC541-7B7A-43D3-8B79-37D633B846F1}">
+                <asvg:svgBlip xmlns:asvg="http://schemas.microsoft.com/office/drawing/2016/SVG/main" r:embed="rId3"/>
+              </a:ext>
+            </a:extLst>
+          </a:blip>
+          <a:stretch>
+            <a:fillRect/>
+          </a:stretch>
+        </p:blipFill>
+        <p:spPr>
+          <a:xfrm>
+            <a:off x="10400700" y="1301719"/>
+            <a:ext cx="376881" cy="376881"/>
+          </a:xfrm>
+          <a:prstGeom prst="rect">
+            <a:avLst/>
+          </a:prstGeom>
+        </p:spPr>
+      </p:pic>
+      <p:pic>
+        <p:nvPicPr>
+          <p:cNvPr id="6" name="Graphic 5" descr="Badge 4 with solid fill">
+            <a:extLst>
+              <a:ext uri="{FF2B5EF4-FFF2-40B4-BE49-F238E27FC236}">
+                <a16:creationId xmlns:a16="http://schemas.microsoft.com/office/drawing/2014/main" id="{8CF970F6-A280-D8D8-0164-F8C9BD1E938F}"/>
+              </a:ext>
+            </a:extLst>
+          </p:cNvPr>
+          <p:cNvPicPr>
+            <a:picLocks noChangeAspect="1"/>
+          </p:cNvPicPr>
+          <p:nvPr/>
+        </p:nvPicPr>
+        <p:blipFill>
+          <a:blip r:embed="rId4">
+            <a:extLst>
+              <a:ext uri="{96DAC541-7B7A-43D3-8B79-37D633B846F1}">
+                <asvg:svgBlip xmlns:asvg="http://schemas.microsoft.com/office/drawing/2016/SVG/main" r:embed="rId5"/>
+              </a:ext>
+            </a:extLst>
+          </a:blip>
+          <a:stretch>
+            <a:fillRect/>
+          </a:stretch>
+        </p:blipFill>
+        <p:spPr>
+          <a:xfrm>
+            <a:off x="6937256" y="1283792"/>
+            <a:ext cx="376881" cy="376881"/>
+          </a:xfrm>
+          <a:prstGeom prst="rect">
+            <a:avLst/>
+          </a:prstGeom>
+        </p:spPr>
+      </p:pic>
+      <p:pic>
+        <p:nvPicPr>
+          <p:cNvPr id="8" name="Graphic 7" descr="Badge with solid fill">
+            <a:extLst>
+              <a:ext uri="{FF2B5EF4-FFF2-40B4-BE49-F238E27FC236}">
+                <a16:creationId xmlns:a16="http://schemas.microsoft.com/office/drawing/2014/main" id="{CC3B4B4B-4E21-B484-E8A6-012D1CC8181B}"/>
+              </a:ext>
+            </a:extLst>
+          </p:cNvPr>
+          <p:cNvPicPr>
+            <a:picLocks noChangeAspect="1"/>
+          </p:cNvPicPr>
+          <p:nvPr/>
+        </p:nvPicPr>
+        <p:blipFill>
+          <a:blip r:embed="rId6">
+            <a:extLst>
+              <a:ext uri="{96DAC541-7B7A-43D3-8B79-37D633B846F1}">
+                <asvg:svgBlip xmlns:asvg="http://schemas.microsoft.com/office/drawing/2016/SVG/main" r:embed="rId7"/>
+              </a:ext>
+            </a:extLst>
+          </a:blip>
+          <a:stretch>
+            <a:fillRect/>
+          </a:stretch>
+        </p:blipFill>
+        <p:spPr>
+          <a:xfrm>
+            <a:off x="3354326" y="1257188"/>
+            <a:ext cx="376881" cy="376881"/>
+          </a:xfrm>
+          <a:prstGeom prst="rect">
+            <a:avLst/>
+          </a:prstGeom>
+        </p:spPr>
+      </p:pic>
+      <p:pic>
+        <p:nvPicPr>
+          <p:cNvPr id="12" name="Graphic 11" descr="Badge 3 with solid fill">
+            <a:extLst>
+              <a:ext uri="{FF2B5EF4-FFF2-40B4-BE49-F238E27FC236}">
+                <a16:creationId xmlns:a16="http://schemas.microsoft.com/office/drawing/2014/main" id="{62A77561-BF29-367F-28F8-08A3EBCACE1A}"/>
+              </a:ext>
+            </a:extLst>
+          </p:cNvPr>
+          <p:cNvPicPr>
+            <a:picLocks noChangeAspect="1"/>
+          </p:cNvPicPr>
+          <p:nvPr/>
+        </p:nvPicPr>
+        <p:blipFill>
+          <a:blip r:embed="rId8">
+            <a:extLst>
+              <a:ext uri="{96DAC541-7B7A-43D3-8B79-37D633B846F1}">
+                <asvg:svgBlip xmlns:asvg="http://schemas.microsoft.com/office/drawing/2016/SVG/main" r:embed="rId9"/>
+              </a:ext>
+            </a:extLst>
+          </a:blip>
+          <a:stretch>
+            <a:fillRect/>
+          </a:stretch>
+        </p:blipFill>
+        <p:spPr>
+          <a:xfrm>
+            <a:off x="5180359" y="1257188"/>
+            <a:ext cx="376881" cy="376881"/>
+          </a:xfrm>
+          <a:prstGeom prst="rect">
+            <a:avLst/>
+          </a:prstGeom>
+        </p:spPr>
+      </p:pic>
+      <p:pic>
+        <p:nvPicPr>
+          <p:cNvPr id="14" name="Graphic 13" descr="Badge 5 with solid fill">
+            <a:extLst>
+              <a:ext uri="{FF2B5EF4-FFF2-40B4-BE49-F238E27FC236}">
+                <a16:creationId xmlns:a16="http://schemas.microsoft.com/office/drawing/2014/main" id="{0DBA3E17-EB18-10DF-C8EC-4066EE3782A1}"/>
+              </a:ext>
+            </a:extLst>
+          </p:cNvPr>
+          <p:cNvPicPr>
+            <a:picLocks noChangeAspect="1"/>
+          </p:cNvPicPr>
+          <p:nvPr/>
+        </p:nvPicPr>
+        <p:blipFill>
+          <a:blip r:embed="rId10">
+            <a:extLst>
+              <a:ext uri="{96DAC541-7B7A-43D3-8B79-37D633B846F1}">
+                <asvg:svgBlip xmlns:asvg="http://schemas.microsoft.com/office/drawing/2016/SVG/main" r:embed="rId11"/>
+              </a:ext>
+            </a:extLst>
+          </a:blip>
+          <a:stretch>
+            <a:fillRect/>
+          </a:stretch>
+        </p:blipFill>
+        <p:spPr>
+          <a:xfrm>
+            <a:off x="8694153" y="1301718"/>
+            <a:ext cx="376881" cy="376881"/>
+          </a:xfrm>
+          <a:prstGeom prst="rect">
+            <a:avLst/>
+          </a:prstGeom>
+        </p:spPr>
+      </p:pic>
+      <p:pic>
+        <p:nvPicPr>
+          <p:cNvPr id="16" name="Graphic 15" descr="Badge 1 with solid fill">
+            <a:extLst>
+              <a:ext uri="{FF2B5EF4-FFF2-40B4-BE49-F238E27FC236}">
+                <a16:creationId xmlns:a16="http://schemas.microsoft.com/office/drawing/2014/main" id="{85906917-5D5D-0EC8-04B4-6B964CA24019}"/>
+              </a:ext>
+            </a:extLst>
+          </p:cNvPr>
+          <p:cNvPicPr>
+            <a:picLocks noChangeAspect="1"/>
+          </p:cNvPicPr>
+          <p:nvPr/>
+        </p:nvPicPr>
+        <p:blipFill>
+          <a:blip r:embed="rId12">
+            <a:extLst>
+              <a:ext uri="{96DAC541-7B7A-43D3-8B79-37D633B846F1}">
+                <asvg:svgBlip xmlns:asvg="http://schemas.microsoft.com/office/drawing/2016/SVG/main" r:embed="rId13"/>
+              </a:ext>
+            </a:extLst>
+          </a:blip>
+          <a:stretch>
+            <a:fillRect/>
+          </a:stretch>
+        </p:blipFill>
+        <p:spPr>
+          <a:xfrm>
+            <a:off x="1528293" y="1257188"/>
+            <a:ext cx="376881" cy="376881"/>
+          </a:xfrm>
+          <a:prstGeom prst="rect">
+            <a:avLst/>
+          </a:prstGeom>
+        </p:spPr>
+      </p:pic>
+      <p:pic>
+        <p:nvPicPr>
+          <p:cNvPr id="25" name="Graphic 24">
+            <a:extLst>
+              <a:ext uri="{FF2B5EF4-FFF2-40B4-BE49-F238E27FC236}">
+                <a16:creationId xmlns:a16="http://schemas.microsoft.com/office/drawing/2014/main" id="{1CD3BAF8-1B68-D00C-E802-FA4D456C41B5}"/>
+              </a:ext>
+            </a:extLst>
+          </p:cNvPr>
+          <p:cNvPicPr>
+            <a:picLocks noChangeAspect="1"/>
+          </p:cNvPicPr>
+          <p:nvPr/>
+        </p:nvPicPr>
+        <p:blipFill>
+          <a:blip r:embed="rId14">
+            <a:extLst>
+              <a:ext uri="{96DAC541-7B7A-43D3-8B79-37D633B846F1}">
+                <asvg:svgBlip xmlns:asvg="http://schemas.microsoft.com/office/drawing/2016/SVG/main" r:embed="rId15"/>
+              </a:ext>
+            </a:extLst>
+          </a:blip>
+          <a:srcRect b="4325"/>
+          <a:stretch/>
+        </p:blipFill>
+        <p:spPr>
+          <a:xfrm>
+            <a:off x="191888" y="925096"/>
+            <a:ext cx="12137802" cy="3560407"/>
+          </a:xfrm>
+          <a:prstGeom prst="rect">
+            <a:avLst/>
+          </a:prstGeom>
+        </p:spPr>
+      </p:pic>
     </p:spTree>
     <p:extLst>
       <p:ext uri="{BB962C8B-B14F-4D97-AF65-F5344CB8AC3E}">
@@ -3670,6 +3897,600 @@
   <p:clrMapOvr>
     <a:masterClrMapping/>
   </p:clrMapOvr>
+  <p:timing>
+    <p:tnLst>
+      <p:par>
+        <p:cTn id="1" dur="indefinite" restart="never" nodeType="tmRoot">
+          <p:childTnLst>
+            <p:seq concurrent="1" nextAc="seek">
+              <p:cTn id="2" dur="indefinite" nodeType="mainSeq">
+                <p:childTnLst>
+                  <p:par>
+                    <p:cTn id="3" fill="hold">
+                      <p:stCondLst>
+                        <p:cond delay="indefinite"/>
+                      </p:stCondLst>
+                      <p:childTnLst>
+                        <p:par>
+                          <p:cTn id="4" fill="hold">
+                            <p:stCondLst>
+                              <p:cond delay="0"/>
+                            </p:stCondLst>
+                            <p:childTnLst>
+                              <p:par>
+                                <p:cTn id="5" presetID="1" presetClass="entr" presetSubtype="0" fill="hold" nodeType="clickEffect">
+                                  <p:stCondLst>
+                                    <p:cond delay="0"/>
+                                  </p:stCondLst>
+                                  <p:childTnLst>
+                                    <p:set>
+                                      <p:cBhvr>
+                                        <p:cTn id="6" dur="1" fill="hold">
+                                          <p:stCondLst>
+                                            <p:cond delay="0"/>
+                                          </p:stCondLst>
+                                        </p:cTn>
+                                        <p:tgtEl>
+                                          <p:spTgt spid="11">
+                                            <p:txEl>
+                                              <p:pRg st="0" end="0"/>
+                                            </p:txEl>
+                                          </p:spTgt>
+                                        </p:tgtEl>
+                                        <p:attrNameLst>
+                                          <p:attrName>style.visibility</p:attrName>
+                                        </p:attrNameLst>
+                                      </p:cBhvr>
+                                      <p:to>
+                                        <p:strVal val="visible"/>
+                                      </p:to>
+                                    </p:set>
+                                  </p:childTnLst>
+                                </p:cTn>
+                              </p:par>
+                            </p:childTnLst>
+                          </p:cTn>
+                        </p:par>
+                      </p:childTnLst>
+                    </p:cTn>
+                  </p:par>
+                  <p:par>
+                    <p:cTn id="7" fill="hold">
+                      <p:stCondLst>
+                        <p:cond delay="indefinite"/>
+                      </p:stCondLst>
+                      <p:childTnLst>
+                        <p:par>
+                          <p:cTn id="8" fill="hold">
+                            <p:stCondLst>
+                              <p:cond delay="0"/>
+                            </p:stCondLst>
+                            <p:childTnLst>
+                              <p:par>
+                                <p:cTn id="9" presetID="1" presetClass="entr" presetSubtype="0" fill="hold" nodeType="clickEffect">
+                                  <p:stCondLst>
+                                    <p:cond delay="0"/>
+                                  </p:stCondLst>
+                                  <p:childTnLst>
+                                    <p:set>
+                                      <p:cBhvr>
+                                        <p:cTn id="10" dur="1" fill="hold">
+                                          <p:stCondLst>
+                                            <p:cond delay="0"/>
+                                          </p:stCondLst>
+                                        </p:cTn>
+                                        <p:tgtEl>
+                                          <p:spTgt spid="16"/>
+                                        </p:tgtEl>
+                                        <p:attrNameLst>
+                                          <p:attrName>style.visibility</p:attrName>
+                                        </p:attrNameLst>
+                                      </p:cBhvr>
+                                      <p:to>
+                                        <p:strVal val="visible"/>
+                                      </p:to>
+                                    </p:set>
+                                  </p:childTnLst>
+                                </p:cTn>
+                              </p:par>
+                            </p:childTnLst>
+                          </p:cTn>
+                        </p:par>
+                      </p:childTnLst>
+                    </p:cTn>
+                  </p:par>
+                  <p:par>
+                    <p:cTn id="11" fill="hold">
+                      <p:stCondLst>
+                        <p:cond delay="indefinite"/>
+                      </p:stCondLst>
+                      <p:childTnLst>
+                        <p:par>
+                          <p:cTn id="12" fill="hold">
+                            <p:stCondLst>
+                              <p:cond delay="0"/>
+                            </p:stCondLst>
+                            <p:childTnLst>
+                              <p:par>
+                                <p:cTn id="13" presetID="1" presetClass="entr" presetSubtype="0" fill="hold" nodeType="clickEffect">
+                                  <p:stCondLst>
+                                    <p:cond delay="0"/>
+                                  </p:stCondLst>
+                                  <p:childTnLst>
+                                    <p:set>
+                                      <p:cBhvr>
+                                        <p:cTn id="14" dur="1" fill="hold">
+                                          <p:stCondLst>
+                                            <p:cond delay="0"/>
+                                          </p:stCondLst>
+                                        </p:cTn>
+                                        <p:tgtEl>
+                                          <p:spTgt spid="11">
+                                            <p:txEl>
+                                              <p:pRg st="1" end="1"/>
+                                            </p:txEl>
+                                          </p:spTgt>
+                                        </p:tgtEl>
+                                        <p:attrNameLst>
+                                          <p:attrName>style.visibility</p:attrName>
+                                        </p:attrNameLst>
+                                      </p:cBhvr>
+                                      <p:to>
+                                        <p:strVal val="visible"/>
+                                      </p:to>
+                                    </p:set>
+                                  </p:childTnLst>
+                                </p:cTn>
+                              </p:par>
+                            </p:childTnLst>
+                          </p:cTn>
+                        </p:par>
+                      </p:childTnLst>
+                    </p:cTn>
+                  </p:par>
+                  <p:par>
+                    <p:cTn id="15" fill="hold">
+                      <p:stCondLst>
+                        <p:cond delay="indefinite"/>
+                      </p:stCondLst>
+                      <p:childTnLst>
+                        <p:par>
+                          <p:cTn id="16" fill="hold">
+                            <p:stCondLst>
+                              <p:cond delay="0"/>
+                            </p:stCondLst>
+                            <p:childTnLst>
+                              <p:par>
+                                <p:cTn id="17" presetID="1" presetClass="entr" presetSubtype="0" fill="hold" nodeType="clickEffect">
+                                  <p:stCondLst>
+                                    <p:cond delay="0"/>
+                                  </p:stCondLst>
+                                  <p:childTnLst>
+                                    <p:set>
+                                      <p:cBhvr>
+                                        <p:cTn id="18" dur="1" fill="hold">
+                                          <p:stCondLst>
+                                            <p:cond delay="0"/>
+                                          </p:stCondLst>
+                                        </p:cTn>
+                                        <p:tgtEl>
+                                          <p:spTgt spid="8"/>
+                                        </p:tgtEl>
+                                        <p:attrNameLst>
+                                          <p:attrName>style.visibility</p:attrName>
+                                        </p:attrNameLst>
+                                      </p:cBhvr>
+                                      <p:to>
+                                        <p:strVal val="visible"/>
+                                      </p:to>
+                                    </p:set>
+                                  </p:childTnLst>
+                                </p:cTn>
+                              </p:par>
+                            </p:childTnLst>
+                          </p:cTn>
+                        </p:par>
+                      </p:childTnLst>
+                    </p:cTn>
+                  </p:par>
+                  <p:par>
+                    <p:cTn id="19" fill="hold">
+                      <p:stCondLst>
+                        <p:cond delay="indefinite"/>
+                      </p:stCondLst>
+                      <p:childTnLst>
+                        <p:par>
+                          <p:cTn id="20" fill="hold">
+                            <p:stCondLst>
+                              <p:cond delay="0"/>
+                            </p:stCondLst>
+                            <p:childTnLst>
+                              <p:par>
+                                <p:cTn id="21" presetID="1" presetClass="entr" presetSubtype="0" fill="hold" nodeType="clickEffect">
+                                  <p:stCondLst>
+                                    <p:cond delay="0"/>
+                                  </p:stCondLst>
+                                  <p:childTnLst>
+                                    <p:set>
+                                      <p:cBhvr>
+                                        <p:cTn id="22" dur="1" fill="hold">
+                                          <p:stCondLst>
+                                            <p:cond delay="0"/>
+                                          </p:stCondLst>
+                                        </p:cTn>
+                                        <p:tgtEl>
+                                          <p:spTgt spid="11">
+                                            <p:txEl>
+                                              <p:pRg st="2" end="2"/>
+                                            </p:txEl>
+                                          </p:spTgt>
+                                        </p:tgtEl>
+                                        <p:attrNameLst>
+                                          <p:attrName>style.visibility</p:attrName>
+                                        </p:attrNameLst>
+                                      </p:cBhvr>
+                                      <p:to>
+                                        <p:strVal val="visible"/>
+                                      </p:to>
+                                    </p:set>
+                                  </p:childTnLst>
+                                </p:cTn>
+                              </p:par>
+                            </p:childTnLst>
+                          </p:cTn>
+                        </p:par>
+                      </p:childTnLst>
+                    </p:cTn>
+                  </p:par>
+                  <p:par>
+                    <p:cTn id="23" fill="hold">
+                      <p:stCondLst>
+                        <p:cond delay="indefinite"/>
+                      </p:stCondLst>
+                      <p:childTnLst>
+                        <p:par>
+                          <p:cTn id="24" fill="hold">
+                            <p:stCondLst>
+                              <p:cond delay="0"/>
+                            </p:stCondLst>
+                            <p:childTnLst>
+                              <p:par>
+                                <p:cTn id="25" presetID="1" presetClass="entr" presetSubtype="0" fill="hold" nodeType="clickEffect">
+                                  <p:stCondLst>
+                                    <p:cond delay="0"/>
+                                  </p:stCondLst>
+                                  <p:childTnLst>
+                                    <p:set>
+                                      <p:cBhvr>
+                                        <p:cTn id="26" dur="1" fill="hold">
+                                          <p:stCondLst>
+                                            <p:cond delay="0"/>
+                                          </p:stCondLst>
+                                        </p:cTn>
+                                        <p:tgtEl>
+                                          <p:spTgt spid="12"/>
+                                        </p:tgtEl>
+                                        <p:attrNameLst>
+                                          <p:attrName>style.visibility</p:attrName>
+                                        </p:attrNameLst>
+                                      </p:cBhvr>
+                                      <p:to>
+                                        <p:strVal val="visible"/>
+                                      </p:to>
+                                    </p:set>
+                                  </p:childTnLst>
+                                </p:cTn>
+                              </p:par>
+                            </p:childTnLst>
+                          </p:cTn>
+                        </p:par>
+                      </p:childTnLst>
+                    </p:cTn>
+                  </p:par>
+                  <p:par>
+                    <p:cTn id="27" fill="hold">
+                      <p:stCondLst>
+                        <p:cond delay="indefinite"/>
+                      </p:stCondLst>
+                      <p:childTnLst>
+                        <p:par>
+                          <p:cTn id="28" fill="hold">
+                            <p:stCondLst>
+                              <p:cond delay="0"/>
+                            </p:stCondLst>
+                            <p:childTnLst>
+                              <p:par>
+                                <p:cTn id="29" presetID="1" presetClass="entr" presetSubtype="0" fill="hold" nodeType="clickEffect">
+                                  <p:stCondLst>
+                                    <p:cond delay="0"/>
+                                  </p:stCondLst>
+                                  <p:childTnLst>
+                                    <p:set>
+                                      <p:cBhvr>
+                                        <p:cTn id="30" dur="1" fill="hold">
+                                          <p:stCondLst>
+                                            <p:cond delay="0"/>
+                                          </p:stCondLst>
+                                        </p:cTn>
+                                        <p:tgtEl>
+                                          <p:spTgt spid="11">
+                                            <p:txEl>
+                                              <p:pRg st="3" end="3"/>
+                                            </p:txEl>
+                                          </p:spTgt>
+                                        </p:tgtEl>
+                                        <p:attrNameLst>
+                                          <p:attrName>style.visibility</p:attrName>
+                                        </p:attrNameLst>
+                                      </p:cBhvr>
+                                      <p:to>
+                                        <p:strVal val="visible"/>
+                                      </p:to>
+                                    </p:set>
+                                  </p:childTnLst>
+                                </p:cTn>
+                              </p:par>
+                            </p:childTnLst>
+                          </p:cTn>
+                        </p:par>
+                      </p:childTnLst>
+                    </p:cTn>
+                  </p:par>
+                  <p:par>
+                    <p:cTn id="31" fill="hold">
+                      <p:stCondLst>
+                        <p:cond delay="indefinite"/>
+                      </p:stCondLst>
+                      <p:childTnLst>
+                        <p:par>
+                          <p:cTn id="32" fill="hold">
+                            <p:stCondLst>
+                              <p:cond delay="0"/>
+                            </p:stCondLst>
+                            <p:childTnLst>
+                              <p:par>
+                                <p:cTn id="33" presetID="1" presetClass="entr" presetSubtype="0" fill="hold" nodeType="clickEffect">
+                                  <p:stCondLst>
+                                    <p:cond delay="0"/>
+                                  </p:stCondLst>
+                                  <p:childTnLst>
+                                    <p:set>
+                                      <p:cBhvr>
+                                        <p:cTn id="34" dur="1" fill="hold">
+                                          <p:stCondLst>
+                                            <p:cond delay="0"/>
+                                          </p:stCondLst>
+                                        </p:cTn>
+                                        <p:tgtEl>
+                                          <p:spTgt spid="6"/>
+                                        </p:tgtEl>
+                                        <p:attrNameLst>
+                                          <p:attrName>style.visibility</p:attrName>
+                                        </p:attrNameLst>
+                                      </p:cBhvr>
+                                      <p:to>
+                                        <p:strVal val="visible"/>
+                                      </p:to>
+                                    </p:set>
+                                  </p:childTnLst>
+                                </p:cTn>
+                              </p:par>
+                            </p:childTnLst>
+                          </p:cTn>
+                        </p:par>
+                      </p:childTnLst>
+                    </p:cTn>
+                  </p:par>
+                  <p:par>
+                    <p:cTn id="35" fill="hold">
+                      <p:stCondLst>
+                        <p:cond delay="indefinite"/>
+                      </p:stCondLst>
+                      <p:childTnLst>
+                        <p:par>
+                          <p:cTn id="36" fill="hold">
+                            <p:stCondLst>
+                              <p:cond delay="0"/>
+                            </p:stCondLst>
+                            <p:childTnLst>
+                              <p:par>
+                                <p:cTn id="37" presetID="1" presetClass="entr" presetSubtype="0" fill="hold" nodeType="clickEffect">
+                                  <p:stCondLst>
+                                    <p:cond delay="0"/>
+                                  </p:stCondLst>
+                                  <p:childTnLst>
+                                    <p:set>
+                                      <p:cBhvr>
+                                        <p:cTn id="38" dur="1" fill="hold">
+                                          <p:stCondLst>
+                                            <p:cond delay="0"/>
+                                          </p:stCondLst>
+                                        </p:cTn>
+                                        <p:tgtEl>
+                                          <p:spTgt spid="11">
+                                            <p:txEl>
+                                              <p:pRg st="4" end="4"/>
+                                            </p:txEl>
+                                          </p:spTgt>
+                                        </p:tgtEl>
+                                        <p:attrNameLst>
+                                          <p:attrName>style.visibility</p:attrName>
+                                        </p:attrNameLst>
+                                      </p:cBhvr>
+                                      <p:to>
+                                        <p:strVal val="visible"/>
+                                      </p:to>
+                                    </p:set>
+                                  </p:childTnLst>
+                                </p:cTn>
+                              </p:par>
+                            </p:childTnLst>
+                          </p:cTn>
+                        </p:par>
+                      </p:childTnLst>
+                    </p:cTn>
+                  </p:par>
+                  <p:par>
+                    <p:cTn id="39" fill="hold">
+                      <p:stCondLst>
+                        <p:cond delay="indefinite"/>
+                      </p:stCondLst>
+                      <p:childTnLst>
+                        <p:par>
+                          <p:cTn id="40" fill="hold">
+                            <p:stCondLst>
+                              <p:cond delay="0"/>
+                            </p:stCondLst>
+                            <p:childTnLst>
+                              <p:par>
+                                <p:cTn id="41" presetID="1" presetClass="entr" presetSubtype="0" fill="hold" nodeType="clickEffect">
+                                  <p:stCondLst>
+                                    <p:cond delay="0"/>
+                                  </p:stCondLst>
+                                  <p:childTnLst>
+                                    <p:set>
+                                      <p:cBhvr>
+                                        <p:cTn id="42" dur="1" fill="hold">
+                                          <p:stCondLst>
+                                            <p:cond delay="0"/>
+                                          </p:stCondLst>
+                                        </p:cTn>
+                                        <p:tgtEl>
+                                          <p:spTgt spid="14"/>
+                                        </p:tgtEl>
+                                        <p:attrNameLst>
+                                          <p:attrName>style.visibility</p:attrName>
+                                        </p:attrNameLst>
+                                      </p:cBhvr>
+                                      <p:to>
+                                        <p:strVal val="visible"/>
+                                      </p:to>
+                                    </p:set>
+                                  </p:childTnLst>
+                                </p:cTn>
+                              </p:par>
+                            </p:childTnLst>
+                          </p:cTn>
+                        </p:par>
+                      </p:childTnLst>
+                    </p:cTn>
+                  </p:par>
+                  <p:par>
+                    <p:cTn id="43" fill="hold">
+                      <p:stCondLst>
+                        <p:cond delay="indefinite"/>
+                      </p:stCondLst>
+                      <p:childTnLst>
+                        <p:par>
+                          <p:cTn id="44" fill="hold">
+                            <p:stCondLst>
+                              <p:cond delay="0"/>
+                            </p:stCondLst>
+                            <p:childTnLst>
+                              <p:par>
+                                <p:cTn id="45" presetID="1" presetClass="entr" presetSubtype="0" fill="hold" nodeType="clickEffect">
+                                  <p:stCondLst>
+                                    <p:cond delay="0"/>
+                                  </p:stCondLst>
+                                  <p:childTnLst>
+                                    <p:set>
+                                      <p:cBhvr>
+                                        <p:cTn id="46" dur="1" fill="hold">
+                                          <p:stCondLst>
+                                            <p:cond delay="0"/>
+                                          </p:stCondLst>
+                                        </p:cTn>
+                                        <p:tgtEl>
+                                          <p:spTgt spid="11">
+                                            <p:txEl>
+                                              <p:pRg st="5" end="5"/>
+                                            </p:txEl>
+                                          </p:spTgt>
+                                        </p:tgtEl>
+                                        <p:attrNameLst>
+                                          <p:attrName>style.visibility</p:attrName>
+                                        </p:attrNameLst>
+                                      </p:cBhvr>
+                                      <p:to>
+                                        <p:strVal val="visible"/>
+                                      </p:to>
+                                    </p:set>
+                                  </p:childTnLst>
+                                </p:cTn>
+                              </p:par>
+                            </p:childTnLst>
+                          </p:cTn>
+                        </p:par>
+                      </p:childTnLst>
+                    </p:cTn>
+                  </p:par>
+                  <p:par>
+                    <p:cTn id="47" fill="hold">
+                      <p:stCondLst>
+                        <p:cond delay="indefinite"/>
+                      </p:stCondLst>
+                      <p:childTnLst>
+                        <p:par>
+                          <p:cTn id="48" fill="hold">
+                            <p:stCondLst>
+                              <p:cond delay="0"/>
+                            </p:stCondLst>
+                            <p:childTnLst>
+                              <p:par>
+                                <p:cTn id="49" presetID="1" presetClass="entr" presetSubtype="0" fill="hold" nodeType="clickEffect">
+                                  <p:stCondLst>
+                                    <p:cond delay="0"/>
+                                  </p:stCondLst>
+                                  <p:childTnLst>
+                                    <p:set>
+                                      <p:cBhvr>
+                                        <p:cTn id="50" dur="1" fill="hold">
+                                          <p:stCondLst>
+                                            <p:cond delay="0"/>
+                                          </p:stCondLst>
+                                        </p:cTn>
+                                        <p:tgtEl>
+                                          <p:spTgt spid="4"/>
+                                        </p:tgtEl>
+                                        <p:attrNameLst>
+                                          <p:attrName>style.visibility</p:attrName>
+                                        </p:attrNameLst>
+                                      </p:cBhvr>
+                                      <p:to>
+                                        <p:strVal val="visible"/>
+                                      </p:to>
+                                    </p:set>
+                                  </p:childTnLst>
+                                </p:cTn>
+                              </p:par>
+                            </p:childTnLst>
+                          </p:cTn>
+                        </p:par>
+                      </p:childTnLst>
+                    </p:cTn>
+                  </p:par>
+                </p:childTnLst>
+              </p:cTn>
+              <p:prevCondLst>
+                <p:cond evt="onPrev" delay="0">
+                  <p:tgtEl>
+                    <p:sldTgt/>
+                  </p:tgtEl>
+                </p:cond>
+              </p:prevCondLst>
+              <p:nextCondLst>
+                <p:cond evt="onNext" delay="0">
+                  <p:tgtEl>
+                    <p:sldTgt/>
+                  </p:tgtEl>
+                </p:cond>
+              </p:nextCondLst>
+            </p:seq>
+          </p:childTnLst>
+        </p:cTn>
+      </p:par>
+    </p:tnLst>
+  </p:timing>
 </p:sld>
 </file>
 

</xml_diff>